<commit_message>
les 11: slides and Postgres in Compose
</commit_message>
<xml_diff>
--- a/doc/advanced/slides/lesson_11.pptx
+++ b/doc/advanced/slides/lesson_11.pptx
@@ -211,7 +211,7 @@
           <a:p>
             <a:fld id="{060F4727-23A3-441E-BA41-9534DD80814F}" type="datetimeFigureOut">
               <a:rPr lang="en-US" smtClean="0"/>
-              <a:t>24-Oct-18</a:t>
+              <a:t>25-Oct-18</a:t>
             </a:fld>
             <a:endParaRPr lang="en-US"/>
           </a:p>
@@ -542,6 +542,90 @@
           <a:bodyPr/>
           <a:lstStyle/>
           <a:p>
+            <a:fld id="{11ADBA3B-C92D-4CFA-B969-3AFAA1A6C2A1}" type="slidenum">
+              <a:rPr lang="en-US" smtClean="0"/>
+              <a:t>12</a:t>
+            </a:fld>
+            <a:endParaRPr lang="en-US"/>
+          </a:p>
+        </p:txBody>
+      </p:sp>
+    </p:spTree>
+    <p:extLst>
+      <p:ext uri="{BB962C8B-B14F-4D97-AF65-F5344CB8AC3E}">
+        <p14:creationId xmlns:p14="http://schemas.microsoft.com/office/powerpoint/2010/main" val="3174802632"/>
+      </p:ext>
+    </p:extLst>
+  </p:cSld>
+  <p:clrMapOvr>
+    <a:masterClrMapping/>
+  </p:clrMapOvr>
+</p:notes>
+</file>
+
+<file path=ppt/notesSlides/notesSlide2.xml><?xml version="1.0" encoding="utf-8"?>
+<p:notes xmlns:a="http://schemas.openxmlformats.org/drawingml/2006/main" xmlns:r="http://schemas.openxmlformats.org/officeDocument/2006/relationships" xmlns:p="http://schemas.openxmlformats.org/presentationml/2006/main">
+  <p:cSld>
+    <p:spTree>
+      <p:nvGrpSpPr>
+        <p:cNvPr id="1" name=""/>
+        <p:cNvGrpSpPr/>
+        <p:nvPr/>
+      </p:nvGrpSpPr>
+      <p:grpSpPr>
+        <a:xfrm>
+          <a:off x="0" y="0"/>
+          <a:ext cx="0" cy="0"/>
+          <a:chOff x="0" y="0"/>
+          <a:chExt cx="0" cy="0"/>
+        </a:xfrm>
+      </p:grpSpPr>
+      <p:sp>
+        <p:nvSpPr>
+          <p:cNvPr id="2" name="Slide Image Placeholder 1"/>
+          <p:cNvSpPr>
+            <a:spLocks noGrp="1" noRot="1" noChangeAspect="1"/>
+          </p:cNvSpPr>
+          <p:nvPr>
+            <p:ph type="sldImg"/>
+          </p:nvPr>
+        </p:nvSpPr>
+        <p:spPr/>
+      </p:sp>
+      <p:sp>
+        <p:nvSpPr>
+          <p:cNvPr id="3" name="Notes Placeholder 2"/>
+          <p:cNvSpPr>
+            <a:spLocks noGrp="1"/>
+          </p:cNvSpPr>
+          <p:nvPr>
+            <p:ph type="body" idx="1"/>
+          </p:nvPr>
+        </p:nvSpPr>
+        <p:spPr/>
+        <p:txBody>
+          <a:bodyPr/>
+          <a:lstStyle/>
+          <a:p>
+            <a:endParaRPr lang="en-US" dirty="0"/>
+          </a:p>
+        </p:txBody>
+      </p:sp>
+      <p:sp>
+        <p:nvSpPr>
+          <p:cNvPr id="4" name="Slide Number Placeholder 3"/>
+          <p:cNvSpPr>
+            <a:spLocks noGrp="1"/>
+          </p:cNvSpPr>
+          <p:nvPr>
+            <p:ph type="sldNum" sz="quarter" idx="10"/>
+          </p:nvPr>
+        </p:nvSpPr>
+        <p:spPr/>
+        <p:txBody>
+          <a:bodyPr/>
+          <a:lstStyle/>
+          <a:p>
             <a:pPr marL="0" marR="0" lvl="0" indent="0" algn="r" defTabSz="914400" rtl="0" eaLnBrk="1" fontAlgn="auto" latinLnBrk="0" hangingPunct="1">
               <a:lnSpc>
                 <a:spcPct val="100000"/>
@@ -754,7 +838,7 @@
           <a:p>
             <a:fld id="{6D7D1AC5-EDA8-4631-9228-9906422CEF8D}" type="datetimeFigureOut">
               <a:rPr lang="en-US" smtClean="0"/>
-              <a:t>24-Oct-18</a:t>
+              <a:t>25-Oct-18</a:t>
             </a:fld>
             <a:endParaRPr lang="en-US"/>
           </a:p>
@@ -924,7 +1008,7 @@
           <a:p>
             <a:fld id="{6D7D1AC5-EDA8-4631-9228-9906422CEF8D}" type="datetimeFigureOut">
               <a:rPr lang="en-US" smtClean="0"/>
-              <a:t>24-Oct-18</a:t>
+              <a:t>25-Oct-18</a:t>
             </a:fld>
             <a:endParaRPr lang="en-US"/>
           </a:p>
@@ -1104,7 +1188,7 @@
           <a:p>
             <a:fld id="{6D7D1AC5-EDA8-4631-9228-9906422CEF8D}" type="datetimeFigureOut">
               <a:rPr lang="en-US" smtClean="0"/>
-              <a:t>24-Oct-18</a:t>
+              <a:t>25-Oct-18</a:t>
             </a:fld>
             <a:endParaRPr lang="en-US"/>
           </a:p>
@@ -1345,7 +1429,7 @@
                 <a:tabLst/>
                 <a:defRPr/>
               </a:pPr>
-              <a:t>24-Oct-18</a:t>
+              <a:t>25-Oct-18</a:t>
             </a:fld>
             <a:endParaRPr kumimoji="0" lang="en-US" sz="1200" b="0" i="0" u="none" strike="noStrike" kern="1200" cap="none" spc="0" normalizeH="0" baseline="0" noProof="0">
               <a:ln>
@@ -1686,7 +1770,7 @@
                 <a:tabLst/>
                 <a:defRPr/>
               </a:pPr>
-              <a:t>24-Oct-18</a:t>
+              <a:t>25-Oct-18</a:t>
             </a:fld>
             <a:endParaRPr kumimoji="0" lang="en-US" sz="1200" b="0" i="0" u="none" strike="noStrike" kern="1200" cap="none" spc="0" normalizeH="0" baseline="0" noProof="0">
               <a:ln>
@@ -2092,7 +2176,7 @@
                 <a:tabLst/>
                 <a:defRPr/>
               </a:pPr>
-              <a:t>24-Oct-18</a:t>
+              <a:t>25-Oct-18</a:t>
             </a:fld>
             <a:endParaRPr kumimoji="0" lang="en-US" sz="1200" b="0" i="0" u="none" strike="noStrike" kern="1200" cap="none" spc="0" normalizeH="0" baseline="0" noProof="0">
               <a:ln>
@@ -2484,7 +2568,7 @@
                 <a:tabLst/>
                 <a:defRPr/>
               </a:pPr>
-              <a:t>24-Oct-18</a:t>
+              <a:t>25-Oct-18</a:t>
             </a:fld>
             <a:endParaRPr kumimoji="0" lang="en-US" sz="1200" b="0" i="0" u="none" strike="noStrike" kern="1200" cap="none" spc="0" normalizeH="0" baseline="0" noProof="0">
               <a:ln>
@@ -3011,7 +3095,7 @@
                 <a:tabLst/>
                 <a:defRPr/>
               </a:pPr>
-              <a:t>24-Oct-18</a:t>
+              <a:t>25-Oct-18</a:t>
             </a:fld>
             <a:endParaRPr kumimoji="0" lang="en-US" sz="1200" b="0" i="0" u="none" strike="noStrike" kern="1200" cap="none" spc="0" normalizeH="0" baseline="0" noProof="0">
               <a:ln>
@@ -3289,7 +3373,7 @@
                 <a:tabLst/>
                 <a:defRPr/>
               </a:pPr>
-              <a:t>24-Oct-18</a:t>
+              <a:t>25-Oct-18</a:t>
             </a:fld>
             <a:endParaRPr kumimoji="0" lang="en-US" sz="1200" b="0" i="0" u="none" strike="noStrike" kern="1200" cap="none" spc="0" normalizeH="0" baseline="0" noProof="0">
               <a:ln>
@@ -3544,7 +3628,7 @@
                 <a:tabLst/>
                 <a:defRPr/>
               </a:pPr>
-              <a:t>24-Oct-18</a:t>
+              <a:t>25-Oct-18</a:t>
             </a:fld>
             <a:endParaRPr kumimoji="0" lang="en-US" sz="1200" b="0" i="0" u="none" strike="noStrike" kern="1200" cap="none" spc="0" normalizeH="0" baseline="0" noProof="0">
               <a:ln>
@@ -3981,7 +4065,7 @@
                 <a:tabLst/>
                 <a:defRPr/>
               </a:pPr>
-              <a:t>24-Oct-18</a:t>
+              <a:t>25-Oct-18</a:t>
             </a:fld>
             <a:endParaRPr kumimoji="0" lang="en-US" sz="1200" b="0" i="0" u="none" strike="noStrike" kern="1200" cap="none" spc="0" normalizeH="0" baseline="0" noProof="0">
               <a:ln>
@@ -4296,7 +4380,7 @@
           <a:p>
             <a:fld id="{6D7D1AC5-EDA8-4631-9228-9906422CEF8D}" type="datetimeFigureOut">
               <a:rPr lang="en-US" smtClean="0"/>
-              <a:t>24-Oct-18</a:t>
+              <a:t>25-Oct-18</a:t>
             </a:fld>
             <a:endParaRPr lang="en-US"/>
           </a:p>
@@ -4598,7 +4682,7 @@
                 <a:tabLst/>
                 <a:defRPr/>
               </a:pPr>
-              <a:t>24-Oct-18</a:t>
+              <a:t>25-Oct-18</a:t>
             </a:fld>
             <a:endParaRPr kumimoji="0" lang="en-US" sz="1200" b="0" i="0" u="none" strike="noStrike" kern="1200" cap="none" spc="0" normalizeH="0" baseline="0" noProof="0">
               <a:ln>
@@ -4928,7 +5012,7 @@
                 <a:tabLst/>
                 <a:defRPr/>
               </a:pPr>
-              <a:t>24-Oct-18</a:t>
+              <a:t>25-Oct-18</a:t>
             </a:fld>
             <a:endParaRPr kumimoji="0" lang="en-US" sz="1200" b="0" i="0" u="none" strike="noStrike" kern="1200" cap="none" spc="0" normalizeH="0" baseline="0" noProof="0">
               <a:ln>
@@ -5268,7 +5352,7 @@
                 <a:tabLst/>
                 <a:defRPr/>
               </a:pPr>
-              <a:t>24-Oct-18</a:t>
+              <a:t>25-Oct-18</a:t>
             </a:fld>
             <a:endParaRPr kumimoji="0" lang="en-US" sz="1200" b="0" i="0" u="none" strike="noStrike" kern="1200" cap="none" spc="0" normalizeH="0" baseline="0" noProof="0">
               <a:ln>
@@ -5620,7 +5704,7 @@
                 <a:tabLst/>
                 <a:defRPr/>
               </a:pPr>
-              <a:t>24-Oct-18</a:t>
+              <a:t>25-Oct-18</a:t>
             </a:fld>
             <a:endParaRPr kumimoji="0" lang="en-US" sz="1200" b="0" i="0" u="none" strike="noStrike" kern="1200" cap="none" spc="0" normalizeH="0" baseline="0" noProof="0">
               <a:ln>
@@ -5961,7 +6045,7 @@
                 <a:tabLst/>
                 <a:defRPr/>
               </a:pPr>
-              <a:t>24-Oct-18</a:t>
+              <a:t>25-Oct-18</a:t>
             </a:fld>
             <a:endParaRPr kumimoji="0" lang="en-US" sz="1200" b="0" i="0" u="none" strike="noStrike" kern="1200" cap="none" spc="0" normalizeH="0" baseline="0" noProof="0">
               <a:ln>
@@ -6367,7 +6451,7 @@
                 <a:tabLst/>
                 <a:defRPr/>
               </a:pPr>
-              <a:t>24-Oct-18</a:t>
+              <a:t>25-Oct-18</a:t>
             </a:fld>
             <a:endParaRPr kumimoji="0" lang="en-US" sz="1200" b="0" i="0" u="none" strike="noStrike" kern="1200" cap="none" spc="0" normalizeH="0" baseline="0" noProof="0">
               <a:ln>
@@ -6759,7 +6843,7 @@
                 <a:tabLst/>
                 <a:defRPr/>
               </a:pPr>
-              <a:t>24-Oct-18</a:t>
+              <a:t>25-Oct-18</a:t>
             </a:fld>
             <a:endParaRPr kumimoji="0" lang="en-US" sz="1200" b="0" i="0" u="none" strike="noStrike" kern="1200" cap="none" spc="0" normalizeH="0" baseline="0" noProof="0">
               <a:ln>
@@ -7286,7 +7370,7 @@
                 <a:tabLst/>
                 <a:defRPr/>
               </a:pPr>
-              <a:t>24-Oct-18</a:t>
+              <a:t>25-Oct-18</a:t>
             </a:fld>
             <a:endParaRPr kumimoji="0" lang="en-US" sz="1200" b="0" i="0" u="none" strike="noStrike" kern="1200" cap="none" spc="0" normalizeH="0" baseline="0" noProof="0">
               <a:ln>
@@ -7564,7 +7648,7 @@
                 <a:tabLst/>
                 <a:defRPr/>
               </a:pPr>
-              <a:t>24-Oct-18</a:t>
+              <a:t>25-Oct-18</a:t>
             </a:fld>
             <a:endParaRPr kumimoji="0" lang="en-US" sz="1200" b="0" i="0" u="none" strike="noStrike" kern="1200" cap="none" spc="0" normalizeH="0" baseline="0" noProof="0">
               <a:ln>
@@ -7819,7 +7903,7 @@
                 <a:tabLst/>
                 <a:defRPr/>
               </a:pPr>
-              <a:t>24-Oct-18</a:t>
+              <a:t>25-Oct-18</a:t>
             </a:fld>
             <a:endParaRPr kumimoji="0" lang="en-US" sz="1200" b="0" i="0" u="none" strike="noStrike" kern="1200" cap="none" spc="0" normalizeH="0" baseline="0" noProof="0">
               <a:ln>
@@ -8176,7 +8260,7 @@
           <a:p>
             <a:fld id="{6D7D1AC5-EDA8-4631-9228-9906422CEF8D}" type="datetimeFigureOut">
               <a:rPr lang="en-US" smtClean="0"/>
-              <a:t>24-Oct-18</a:t>
+              <a:t>25-Oct-18</a:t>
             </a:fld>
             <a:endParaRPr lang="en-US"/>
           </a:p>
@@ -8502,7 +8586,7 @@
                 <a:tabLst/>
                 <a:defRPr/>
               </a:pPr>
-              <a:t>24-Oct-18</a:t>
+              <a:t>25-Oct-18</a:t>
             </a:fld>
             <a:endParaRPr kumimoji="0" lang="en-US" sz="1200" b="0" i="0" u="none" strike="noStrike" kern="1200" cap="none" spc="0" normalizeH="0" baseline="0" noProof="0">
               <a:ln>
@@ -8915,7 +8999,7 @@
                 <a:tabLst/>
                 <a:defRPr/>
               </a:pPr>
-              <a:t>24-Oct-18</a:t>
+              <a:t>25-Oct-18</a:t>
             </a:fld>
             <a:endParaRPr kumimoji="0" lang="en-US" sz="1200" b="0" i="0" u="none" strike="noStrike" kern="1200" cap="none" spc="0" normalizeH="0" baseline="0" noProof="0">
               <a:ln>
@@ -9245,7 +9329,7 @@
                 <a:tabLst/>
                 <a:defRPr/>
               </a:pPr>
-              <a:t>24-Oct-18</a:t>
+              <a:t>25-Oct-18</a:t>
             </a:fld>
             <a:endParaRPr kumimoji="0" lang="en-US" sz="1200" b="0" i="0" u="none" strike="noStrike" kern="1200" cap="none" spc="0" normalizeH="0" baseline="0" noProof="0">
               <a:ln>
@@ -9585,7 +9669,7 @@
                 <a:tabLst/>
                 <a:defRPr/>
               </a:pPr>
-              <a:t>24-Oct-18</a:t>
+              <a:t>25-Oct-18</a:t>
             </a:fld>
             <a:endParaRPr kumimoji="0" lang="en-US" sz="1200" b="0" i="0" u="none" strike="noStrike" kern="1200" cap="none" spc="0" normalizeH="0" baseline="0" noProof="0">
               <a:ln>
@@ -9928,7 +10012,7 @@
           <a:p>
             <a:fld id="{6D7D1AC5-EDA8-4631-9228-9906422CEF8D}" type="datetimeFigureOut">
               <a:rPr lang="en-US" smtClean="0"/>
-              <a:t>24-Oct-18</a:t>
+              <a:t>25-Oct-18</a:t>
             </a:fld>
             <a:endParaRPr lang="en-US"/>
           </a:p>
@@ -10295,7 +10379,7 @@
           <a:p>
             <a:fld id="{6D7D1AC5-EDA8-4631-9228-9906422CEF8D}" type="datetimeFigureOut">
               <a:rPr lang="en-US" smtClean="0"/>
-              <a:t>24-Oct-18</a:t>
+              <a:t>25-Oct-18</a:t>
             </a:fld>
             <a:endParaRPr lang="en-US"/>
           </a:p>
@@ -10413,7 +10497,7 @@
           <a:p>
             <a:fld id="{6D7D1AC5-EDA8-4631-9228-9906422CEF8D}" type="datetimeFigureOut">
               <a:rPr lang="en-US" smtClean="0"/>
-              <a:t>24-Oct-18</a:t>
+              <a:t>25-Oct-18</a:t>
             </a:fld>
             <a:endParaRPr lang="en-US"/>
           </a:p>
@@ -10508,7 +10592,7 @@
           <a:p>
             <a:fld id="{6D7D1AC5-EDA8-4631-9228-9906422CEF8D}" type="datetimeFigureOut">
               <a:rPr lang="en-US" smtClean="0"/>
-              <a:t>24-Oct-18</a:t>
+              <a:t>25-Oct-18</a:t>
             </a:fld>
             <a:endParaRPr lang="en-US"/>
           </a:p>
@@ -10785,7 +10869,7 @@
           <a:p>
             <a:fld id="{6D7D1AC5-EDA8-4631-9228-9906422CEF8D}" type="datetimeFigureOut">
               <a:rPr lang="en-US" smtClean="0"/>
-              <a:t>24-Oct-18</a:t>
+              <a:t>25-Oct-18</a:t>
             </a:fld>
             <a:endParaRPr lang="en-US"/>
           </a:p>
@@ -11038,7 +11122,7 @@
           <a:p>
             <a:fld id="{6D7D1AC5-EDA8-4631-9228-9906422CEF8D}" type="datetimeFigureOut">
               <a:rPr lang="en-US" smtClean="0"/>
-              <a:t>24-Oct-18</a:t>
+              <a:t>25-Oct-18</a:t>
             </a:fld>
             <a:endParaRPr lang="en-US"/>
           </a:p>
@@ -11251,7 +11335,7 @@
           <a:p>
             <a:fld id="{6D7D1AC5-EDA8-4631-9228-9906422CEF8D}" type="datetimeFigureOut">
               <a:rPr lang="en-US" smtClean="0"/>
-              <a:t>24-Oct-18</a:t>
+              <a:t>25-Oct-18</a:t>
             </a:fld>
             <a:endParaRPr lang="en-US"/>
           </a:p>
@@ -11840,7 +11924,7 @@
                 <a:tabLst/>
                 <a:defRPr/>
               </a:pPr>
-              <a:t>24-Oct-18</a:t>
+              <a:t>25-Oct-18</a:t>
             </a:fld>
             <a:endParaRPr kumimoji="0" lang="en-US" sz="1200" b="0" i="0" u="none" strike="noStrike" kern="1200" cap="none" spc="0" normalizeH="0" baseline="0" noProof="0">
               <a:ln>
@@ -12540,7 +12624,7 @@
                 <a:tabLst/>
                 <a:defRPr/>
               </a:pPr>
-              <a:t>24-Oct-18</a:t>
+              <a:t>25-Oct-18</a:t>
             </a:fld>
             <a:endParaRPr kumimoji="0" lang="en-US" sz="1200" b="0" i="0" u="none" strike="noStrike" kern="1200" cap="none" spc="0" normalizeH="0" baseline="0" noProof="0">
               <a:ln>
@@ -13423,11 +13507,7 @@
             </a:r>
             <a:r>
               <a:rPr lang="en-US" dirty="0" smtClean="0"/>
-              <a:t>: Distributed </a:t>
-            </a:r>
-            <a:r>
-              <a:rPr lang="en-US" dirty="0" smtClean="0"/>
-              <a:t>Session</a:t>
+              <a:t>: Distributed Session</a:t>
             </a:r>
             <a:endParaRPr lang="en-US" dirty="0"/>
           </a:p>
@@ -13579,42 +13659,116 @@
       </p:grpSpPr>
       <p:sp>
         <p:nvSpPr>
-          <p:cNvPr id="2" name="Title 1"/>
-          <p:cNvSpPr>
-            <a:spLocks noGrp="1"/>
-          </p:cNvSpPr>
-          <p:nvPr>
-            <p:ph type="title"/>
-          </p:nvPr>
-        </p:nvSpPr>
-        <p:spPr/>
+          <p:cNvPr id="3" name="Content Placeholder 2"/>
+          <p:cNvSpPr>
+            <a:spLocks noGrp="1"/>
+          </p:cNvSpPr>
+          <p:nvPr>
+            <p:ph idx="1"/>
+          </p:nvPr>
+        </p:nvSpPr>
+        <p:spPr>
+          <a:xfrm>
+            <a:off x="7728065" y="515405"/>
+            <a:ext cx="4463935" cy="6342595"/>
+          </a:xfrm>
+        </p:spPr>
         <p:txBody>
           <a:bodyPr/>
           <a:lstStyle/>
           <a:p>
-            <a:endParaRPr lang="en-US"/>
-          </a:p>
-        </p:txBody>
-      </p:sp>
-      <p:sp>
-        <p:nvSpPr>
-          <p:cNvPr id="3" name="Content Placeholder 2"/>
-          <p:cNvSpPr>
-            <a:spLocks noGrp="1"/>
-          </p:cNvSpPr>
-          <p:nvPr>
-            <p:ph idx="1"/>
-          </p:nvPr>
-        </p:nvSpPr>
-        <p:spPr/>
-        <p:txBody>
-          <a:bodyPr/>
-          <a:lstStyle/>
-          <a:p>
-            <a:endParaRPr lang="en-US"/>
-          </a:p>
-        </p:txBody>
-      </p:sp>
+            <a:r>
+              <a:rPr lang="en-US" dirty="0" smtClean="0"/>
+              <a:t>User first gets token from </a:t>
+            </a:r>
+            <a:r>
+              <a:rPr lang="en-US" dirty="0" err="1" smtClean="0"/>
+              <a:t>Auth</a:t>
+            </a:r>
+            <a:r>
+              <a:rPr lang="en-US" dirty="0" smtClean="0"/>
+              <a:t> (via </a:t>
+            </a:r>
+            <a:r>
+              <a:rPr lang="en-US" i="1" dirty="0" smtClean="0"/>
+              <a:t>Set-Cookie</a:t>
+            </a:r>
+            <a:r>
+              <a:rPr lang="en-US" dirty="0" smtClean="0"/>
+              <a:t>)</a:t>
+            </a:r>
+          </a:p>
+          <a:p>
+            <a:r>
+              <a:rPr lang="en-US" dirty="0" smtClean="0"/>
+              <a:t>Added at each request with </a:t>
+            </a:r>
+            <a:r>
+              <a:rPr lang="en-US" i="1" dirty="0" smtClean="0"/>
+              <a:t>Cookie</a:t>
+            </a:r>
+          </a:p>
+          <a:p>
+            <a:r>
+              <a:rPr lang="en-US" dirty="0" smtClean="0"/>
+              <a:t>At each request, services checking with </a:t>
+            </a:r>
+            <a:r>
+              <a:rPr lang="en-US" i="1" dirty="0" err="1" smtClean="0"/>
+              <a:t>Redis</a:t>
+            </a:r>
+            <a:r>
+              <a:rPr lang="en-US" dirty="0" smtClean="0"/>
+              <a:t> </a:t>
+            </a:r>
+          </a:p>
+          <a:p>
+            <a:r>
+              <a:rPr lang="en-US" i="1" dirty="0" err="1" smtClean="0"/>
+              <a:t>Redis</a:t>
+            </a:r>
+            <a:r>
+              <a:rPr lang="en-US" dirty="0" smtClean="0"/>
+              <a:t> must be fast</a:t>
+            </a:r>
+            <a:r>
+              <a:rPr lang="en-US" dirty="0" smtClean="0"/>
+              <a:t> </a:t>
+            </a:r>
+            <a:endParaRPr lang="en-US" dirty="0"/>
+          </a:p>
+        </p:txBody>
+      </p:sp>
+      <p:pic>
+        <p:nvPicPr>
+          <p:cNvPr id="4" name="Picture 3"/>
+          <p:cNvPicPr>
+            <a:picLocks noChangeAspect="1"/>
+          </p:cNvPicPr>
+          <p:nvPr/>
+        </p:nvPicPr>
+        <p:blipFill>
+          <a:blip r:embed="rId3">
+            <a:extLst>
+              <a:ext uri="{28A0092B-C50C-407E-A947-70E740481C1C}">
+                <a14:useLocalDpi xmlns:a14="http://schemas.microsoft.com/office/drawing/2010/main" val="0"/>
+              </a:ext>
+            </a:extLst>
+          </a:blip>
+          <a:stretch>
+            <a:fillRect/>
+          </a:stretch>
+        </p:blipFill>
+        <p:spPr>
+          <a:xfrm>
+            <a:off x="154911" y="0"/>
+            <a:ext cx="7293293" cy="6741606"/>
+          </a:xfrm>
+          <a:prstGeom prst="rect">
+            <a:avLst/>
+          </a:prstGeom>
+        </p:spPr>
+      </p:pic>
     </p:spTree>
     <p:extLst>
       <p:ext uri="{BB962C8B-B14F-4D97-AF65-F5344CB8AC3E}">
@@ -14120,7 +14274,15 @@
           <a:p>
             <a:r>
               <a:rPr lang="en-US" dirty="0" smtClean="0"/>
-              <a:t>Need a way to tell that sequence of HTTP/S calls come from same user</a:t>
+              <a:t>Need a way to tell that sequence of HTTP/S calls </a:t>
+            </a:r>
+            <a:r>
+              <a:rPr lang="en-US" dirty="0" smtClean="0"/>
+              <a:t>comes </a:t>
+            </a:r>
+            <a:r>
+              <a:rPr lang="en-US" dirty="0" smtClean="0"/>
+              <a:t>from same user</a:t>
             </a:r>
           </a:p>
           <a:p>

</xml_diff>